<commit_message>
nuevo archivo y modificacion
</commit_message>
<xml_diff>
--- a/documentacion/Casos de uso y diagramas.pptx
+++ b/documentacion/Casos de uso y diagramas.pptx
@@ -13,6 +13,7 @@
     <p:sldId id="261" r:id="rId7"/>
     <p:sldId id="262" r:id="rId8"/>
     <p:sldId id="263" r:id="rId9"/>
+    <p:sldId id="265" r:id="rId10"/>
   </p:sldIdLst>
   <p:sldSz cx="9144000" cy="6858000" type="screen4x3"/>
   <p:notesSz cx="6858000" cy="9144000"/>
@@ -239,7 +240,7 @@
           <a:p>
             <a:fld id="{DBFB80E7-44BA-4312-9D0B-3EB3E46EB033}" type="datetimeFigureOut">
               <a:rPr lang="es-AR" smtClean="0"/>
-              <a:t>25/11/2024</a:t>
+              <a:t>29/11/2024</a:t>
             </a:fld>
             <a:endParaRPr lang="es-AR"/>
           </a:p>
@@ -872,7 +873,7 @@
           <a:p>
             <a:fld id="{DBFB80E7-44BA-4312-9D0B-3EB3E46EB033}" type="datetimeFigureOut">
               <a:rPr lang="es-AR" smtClean="0"/>
-              <a:t>25/11/2024</a:t>
+              <a:t>29/11/2024</a:t>
             </a:fld>
             <a:endParaRPr lang="es-AR"/>
           </a:p>
@@ -1149,7 +1150,7 @@
           <a:p>
             <a:fld id="{DBFB80E7-44BA-4312-9D0B-3EB3E46EB033}" type="datetimeFigureOut">
               <a:rPr lang="es-AR" smtClean="0"/>
-              <a:t>25/11/2024</a:t>
+              <a:t>29/11/2024</a:t>
             </a:fld>
             <a:endParaRPr lang="es-AR"/>
           </a:p>
@@ -1314,7 +1315,7 @@
           <a:p>
             <a:fld id="{DBFB80E7-44BA-4312-9D0B-3EB3E46EB033}" type="datetimeFigureOut">
               <a:rPr lang="es-AR" smtClean="0"/>
-              <a:t>25/11/2024</a:t>
+              <a:t>29/11/2024</a:t>
             </a:fld>
             <a:endParaRPr lang="es-AR"/>
           </a:p>
@@ -1495,7 +1496,7 @@
           <a:p>
             <a:fld id="{DBFB80E7-44BA-4312-9D0B-3EB3E46EB033}" type="datetimeFigureOut">
               <a:rPr lang="es-AR" smtClean="0"/>
-              <a:t>25/11/2024</a:t>
+              <a:t>29/11/2024</a:t>
             </a:fld>
             <a:endParaRPr lang="es-AR"/>
           </a:p>
@@ -2140,7 +2141,7 @@
           <a:p>
             <a:fld id="{DBFB80E7-44BA-4312-9D0B-3EB3E46EB033}" type="datetimeFigureOut">
               <a:rPr lang="es-AR" smtClean="0"/>
-              <a:t>25/11/2024</a:t>
+              <a:t>29/11/2024</a:t>
             </a:fld>
             <a:endParaRPr lang="es-AR"/>
           </a:p>
@@ -2566,7 +2567,7 @@
           <a:p>
             <a:fld id="{DBFB80E7-44BA-4312-9D0B-3EB3E46EB033}" type="datetimeFigureOut">
               <a:rPr lang="es-AR" smtClean="0"/>
-              <a:t>25/11/2024</a:t>
+              <a:t>29/11/2024</a:t>
             </a:fld>
             <a:endParaRPr lang="es-AR"/>
           </a:p>
@@ -2679,7 +2680,7 @@
           <a:p>
             <a:fld id="{DBFB80E7-44BA-4312-9D0B-3EB3E46EB033}" type="datetimeFigureOut">
               <a:rPr lang="es-AR" smtClean="0"/>
-              <a:t>25/11/2024</a:t>
+              <a:t>29/11/2024</a:t>
             </a:fld>
             <a:endParaRPr lang="es-AR"/>
           </a:p>
@@ -2860,7 +2861,7 @@
           <a:p>
             <a:fld id="{DBFB80E7-44BA-4312-9D0B-3EB3E46EB033}" type="datetimeFigureOut">
               <a:rPr lang="es-AR" smtClean="0"/>
-              <a:t>25/11/2024</a:t>
+              <a:t>29/11/2024</a:t>
             </a:fld>
             <a:endParaRPr lang="es-AR"/>
           </a:p>
@@ -3126,7 +3127,7 @@
           <a:p>
             <a:fld id="{DBFB80E7-44BA-4312-9D0B-3EB3E46EB033}" type="datetimeFigureOut">
               <a:rPr lang="es-AR" smtClean="0"/>
-              <a:t>25/11/2024</a:t>
+              <a:t>29/11/2024</a:t>
             </a:fld>
             <a:endParaRPr lang="es-AR"/>
           </a:p>
@@ -3596,7 +3597,7 @@
           <a:p>
             <a:fld id="{DBFB80E7-44BA-4312-9D0B-3EB3E46EB033}" type="datetimeFigureOut">
               <a:rPr lang="es-AR" smtClean="0"/>
-              <a:t>25/11/2024</a:t>
+              <a:t>29/11/2024</a:t>
             </a:fld>
             <a:endParaRPr lang="es-AR"/>
           </a:p>
@@ -4156,7 +4157,7 @@
           <a:p>
             <a:fld id="{DBFB80E7-44BA-4312-9D0B-3EB3E46EB033}" type="datetimeFigureOut">
               <a:rPr lang="es-AR" smtClean="0"/>
-              <a:t>25/11/2024</a:t>
+              <a:t>29/11/2024</a:t>
             </a:fld>
             <a:endParaRPr lang="es-AR"/>
           </a:p>
@@ -8093,6 +8094,127 @@
     <p:extLst>
       <p:ext uri="{BB962C8B-B14F-4D97-AF65-F5344CB8AC3E}">
         <p14:creationId xmlns:p14="http://schemas.microsoft.com/office/powerpoint/2010/main" val="3960871638"/>
+      </p:ext>
+    </p:extLst>
+  </p:cSld>
+  <p:clrMapOvr>
+    <a:masterClrMapping/>
+  </p:clrMapOvr>
+  <p:timing>
+    <p:tnLst>
+      <p:par>
+        <p:cTn id="1" dur="indefinite" restart="never" nodeType="tmRoot"/>
+      </p:par>
+    </p:tnLst>
+  </p:timing>
+</p:sld>
+</file>
+
+<file path=ppt/slides/slide9.xml><?xml version="1.0" encoding="utf-8"?>
+<p:sld xmlns:a="http://schemas.openxmlformats.org/drawingml/2006/main" xmlns:r="http://schemas.openxmlformats.org/officeDocument/2006/relationships" xmlns:p="http://schemas.openxmlformats.org/presentationml/2006/main">
+  <p:cSld>
+    <p:spTree>
+      <p:nvGrpSpPr>
+        <p:cNvPr id="1" name=""/>
+        <p:cNvGrpSpPr/>
+        <p:nvPr/>
+      </p:nvGrpSpPr>
+      <p:grpSpPr>
+        <a:xfrm>
+          <a:off x="0" y="0"/>
+          <a:ext cx="0" cy="0"/>
+          <a:chOff x="0" y="0"/>
+          <a:chExt cx="0" cy="0"/>
+        </a:xfrm>
+      </p:grpSpPr>
+      <p:sp>
+        <p:nvSpPr>
+          <p:cNvPr id="3" name="2 Marcador de texto"/>
+          <p:cNvSpPr>
+            <a:spLocks noGrp="1"/>
+          </p:cNvSpPr>
+          <p:nvPr>
+            <p:ph type="body" sz="half" idx="2"/>
+          </p:nvPr>
+        </p:nvSpPr>
+        <p:spPr/>
+        <p:txBody>
+          <a:bodyPr/>
+          <a:lstStyle/>
+          <a:p>
+            <a:endParaRPr lang="es-AR"/>
+          </a:p>
+        </p:txBody>
+      </p:sp>
+      <p:sp>
+        <p:nvSpPr>
+          <p:cNvPr id="4" name="3 Título"/>
+          <p:cNvSpPr>
+            <a:spLocks noGrp="1"/>
+          </p:cNvSpPr>
+          <p:nvPr>
+            <p:ph type="title"/>
+          </p:nvPr>
+        </p:nvSpPr>
+        <p:spPr/>
+        <p:txBody>
+          <a:bodyPr/>
+          <a:lstStyle/>
+          <a:p>
+            <a:r>
+              <a:rPr lang="es-ES" dirty="0" smtClean="0">
+                <a:solidFill>
+                  <a:schemeClr val="accent3">
+                    <a:lumMod val="75000"/>
+                  </a:schemeClr>
+                </a:solidFill>
+              </a:rPr>
+              <a:t>Diagrama de la relación de las tablas</a:t>
+            </a:r>
+            <a:endParaRPr lang="es-AR" dirty="0">
+              <a:solidFill>
+                <a:schemeClr val="accent3">
+                  <a:lumMod val="75000"/>
+                </a:schemeClr>
+              </a:solidFill>
+            </a:endParaRPr>
+          </a:p>
+        </p:txBody>
+      </p:sp>
+      <p:pic>
+        <p:nvPicPr>
+          <p:cNvPr id="7" name="6 Imagen"/>
+          <p:cNvPicPr>
+            <a:picLocks noChangeAspect="1"/>
+          </p:cNvPicPr>
+          <p:nvPr/>
+        </p:nvPicPr>
+        <p:blipFill>
+          <a:blip r:embed="rId2">
+            <a:extLst>
+              <a:ext uri="{28A0092B-C50C-407E-A947-70E740481C1C}">
+                <a14:useLocalDpi xmlns:a14="http://schemas.microsoft.com/office/drawing/2010/main" val="0"/>
+              </a:ext>
+            </a:extLst>
+          </a:blip>
+          <a:stretch>
+            <a:fillRect/>
+          </a:stretch>
+        </p:blipFill>
+        <p:spPr>
+          <a:xfrm>
+            <a:off x="1547664" y="548680"/>
+            <a:ext cx="6192688" cy="4157165"/>
+          </a:xfrm>
+          <a:prstGeom prst="rect">
+            <a:avLst/>
+          </a:prstGeom>
+        </p:spPr>
+      </p:pic>
+    </p:spTree>
+    <p:extLst>
+      <p:ext uri="{BB962C8B-B14F-4D97-AF65-F5344CB8AC3E}">
+        <p14:creationId xmlns:p14="http://schemas.microsoft.com/office/powerpoint/2010/main" val="1804449526"/>
       </p:ext>
     </p:extLst>
   </p:cSld>

</xml_diff>